<commit_message>
edited week_3 presentation and added basis for typescript examples
</commit_message>
<xml_diff>
--- a/presentation/Week3_presentation.pptx
+++ b/presentation/Week3_presentation.pptx
@@ -110,6 +110,11 @@
       </a:defRPr>
     </a:lvl9pPr>
   </p:defaultTextStyle>
+  <p:extLst>
+    <p:ext uri="{EFAFB233-063F-42B5-8137-9DF3F51BA10A}">
+      <p15:sldGuideLst xmlns:p15="http://schemas.microsoft.com/office/powerpoint/2012/main"/>
+    </p:ext>
+  </p:extLst>
 </p:presentation>
 </file>
 
@@ -30962,7 +30967,9 @@
         </p:nvSpPr>
         <p:spPr/>
         <p:txBody>
-          <a:bodyPr/>
+          <a:bodyPr>
+            <a:normAutofit fontScale="70000" lnSpcReduction="20000"/>
+          </a:bodyPr>
           <a:lstStyle/>
           <a:p>
             <a:r>
@@ -31011,6 +31018,135 @@
               <a:rPr lang="en-US" dirty="0"/>
               <a:t> and typescript users to use the package as intended.</a:t>
             </a:r>
+          </a:p>
+          <a:p>
+            <a:r>
+              <a:rPr lang="en-US" dirty="0"/>
+              <a:t> sidenote: typescript can compile into any desired version of </a:t>
+            </a:r>
+            <a:r>
+              <a:rPr lang="en-US" dirty="0" err="1"/>
+              <a:t>javascript</a:t>
+            </a:r>
+            <a:r>
+              <a:rPr lang="en-US" dirty="0"/>
+              <a:t>. So if you want to use the es2019</a:t>
+            </a:r>
+            <a:br>
+              <a:rPr lang="en-US" dirty="0"/>
+            </a:br>
+            <a:r>
+              <a:rPr lang="en-GB" dirty="0">
+                <a:solidFill>
+                  <a:srgbClr val="1F1C1B"/>
+                </a:solidFill>
+                <a:effectLst/>
+              </a:rPr>
+              <a:t>&gt; '</a:t>
+            </a:r>
+            <a:r>
+              <a:rPr lang="en-GB" dirty="0" err="1">
+                <a:solidFill>
+                  <a:srgbClr val="1F1C1B"/>
+                </a:solidFill>
+                <a:effectLst/>
+              </a:rPr>
+              <a:t>abbbaab</a:t>
+            </a:r>
+            <a:r>
+              <a:rPr lang="en-GB" dirty="0">
+                <a:solidFill>
+                  <a:srgbClr val="1F1C1B"/>
+                </a:solidFill>
+                <a:effectLst/>
+              </a:rPr>
+              <a:t>'.</a:t>
+            </a:r>
+            <a:r>
+              <a:rPr lang="en-GB" dirty="0" err="1">
+                <a:solidFill>
+                  <a:srgbClr val="1F1C1B"/>
+                </a:solidFill>
+                <a:effectLst/>
+              </a:rPr>
+              <a:t>replaceAll</a:t>
+            </a:r>
+            <a:r>
+              <a:rPr lang="en-GB" dirty="0">
+                <a:solidFill>
+                  <a:srgbClr val="1F1C1B"/>
+                </a:solidFill>
+                <a:effectLst/>
+              </a:rPr>
+              <a:t>('b', 'x’)</a:t>
+            </a:r>
+            <a:r>
+              <a:rPr lang="en-GB" dirty="0"/>
+              <a:t> //</a:t>
+            </a:r>
+            <a:r>
+              <a:rPr lang="en-GB" b="1" dirty="0">
+                <a:solidFill>
+                  <a:srgbClr val="1F1C1B"/>
+                </a:solidFill>
+                <a:effectLst/>
+              </a:rPr>
+              <a:t>'</a:t>
+            </a:r>
+            <a:r>
+              <a:rPr lang="en-GB" b="1" dirty="0" err="1">
+                <a:solidFill>
+                  <a:srgbClr val="1F1C1B"/>
+                </a:solidFill>
+                <a:effectLst/>
+              </a:rPr>
+              <a:t>axxxaax</a:t>
+            </a:r>
+            <a:r>
+              <a:rPr lang="en-GB" b="1" dirty="0">
+                <a:solidFill>
+                  <a:srgbClr val="1F1C1B"/>
+                </a:solidFill>
+                <a:effectLst/>
+              </a:rPr>
+              <a:t>’</a:t>
+            </a:r>
+            <a:br>
+              <a:rPr lang="en-GB" b="1" dirty="0">
+                <a:solidFill>
+                  <a:srgbClr val="1F1C1B"/>
+                </a:solidFill>
+                <a:effectLst/>
+              </a:rPr>
+            </a:br>
+            <a:r>
+              <a:rPr lang="en-GB" dirty="0">
+                <a:solidFill>
+                  <a:srgbClr val="1F1C1B"/>
+                </a:solidFill>
+                <a:effectLst/>
+              </a:rPr>
+              <a:t>method typescript could compile this to es5 to be compatible with all browsers not just ones that support the newest </a:t>
+            </a:r>
+            <a:r>
+              <a:rPr lang="en-GB" dirty="0" err="1">
+                <a:solidFill>
+                  <a:srgbClr val="1F1C1B"/>
+                </a:solidFill>
+                <a:effectLst/>
+              </a:rPr>
+              <a:t>js</a:t>
+            </a:r>
+            <a:r>
+              <a:rPr lang="en-GB" dirty="0">
+                <a:solidFill>
+                  <a:srgbClr val="1F1C1B"/>
+                </a:solidFill>
+                <a:effectLst/>
+              </a:rPr>
+              <a:t> versions</a:t>
+            </a:r>
+            <a:endParaRPr lang="en-US" dirty="0"/>
           </a:p>
         </p:txBody>
       </p:sp>

</xml_diff>